<commit_message>
added elementparser and model
element parser makes powerpoint object into typed object for easy access
</commit_message>
<xml_diff>
--- a/TeluguApp.pptx
+++ b/TeluguApp.pptx
@@ -5,7 +5,11 @@
     <p:sldMasterId id="2147483648" r:id="rId1"/>
   </p:sldMasterIdLst>
   <p:sldIdLst>
-    <p:sldId id="256" r:id="rId2"/>
+    <p:sldId id="259" r:id="rId2"/>
+    <p:sldId id="256" r:id="rId3"/>
+    <p:sldId id="260" r:id="rId4"/>
+    <p:sldId id="261" r:id="rId5"/>
+    <p:sldId id="257" r:id="rId6"/>
   </p:sldIdLst>
   <p:sldSz cx="12192000" cy="6858000"/>
   <p:notesSz cx="6858000" cy="9144000"/>
@@ -112,12 +116,12 @@
             <a:srgbClr val="A4A3A4"/>
           </p15:clr>
         </p15:guide>
-        <p15:guide id="2" pos="3840" userDrawn="1">
+        <p15:guide id="2" pos="1224" userDrawn="1">
           <p15:clr>
             <a:srgbClr val="A4A3A4"/>
           </p15:clr>
         </p15:guide>
-        <p15:guide id="3" pos="3940" userDrawn="1">
+        <p15:guide id="3" pos="6432" userDrawn="1">
           <p15:clr>
             <a:srgbClr val="A4A3A4"/>
           </p15:clr>
@@ -275,7 +279,7 @@
           <a:p>
             <a:fld id="{0F076D73-6AE3-5240-8615-7A42779E2E4B}" type="datetimeFigureOut">
               <a:rPr lang="en-US" smtClean="0"/>
-              <a:t>6/25/18</a:t>
+              <a:t>6/28/18</a:t>
             </a:fld>
             <a:endParaRPr lang="en-US"/>
           </a:p>
@@ -473,7 +477,7 @@
           <a:p>
             <a:fld id="{0F076D73-6AE3-5240-8615-7A42779E2E4B}" type="datetimeFigureOut">
               <a:rPr lang="en-US" smtClean="0"/>
-              <a:t>6/25/18</a:t>
+              <a:t>6/28/18</a:t>
             </a:fld>
             <a:endParaRPr lang="en-US"/>
           </a:p>
@@ -681,7 +685,7 @@
           <a:p>
             <a:fld id="{0F076D73-6AE3-5240-8615-7A42779E2E4B}" type="datetimeFigureOut">
               <a:rPr lang="en-US" smtClean="0"/>
-              <a:t>6/25/18</a:t>
+              <a:t>6/28/18</a:t>
             </a:fld>
             <a:endParaRPr lang="en-US"/>
           </a:p>
@@ -879,7 +883,7 @@
           <a:p>
             <a:fld id="{0F076D73-6AE3-5240-8615-7A42779E2E4B}" type="datetimeFigureOut">
               <a:rPr lang="en-US" smtClean="0"/>
-              <a:t>6/25/18</a:t>
+              <a:t>6/28/18</a:t>
             </a:fld>
             <a:endParaRPr lang="en-US"/>
           </a:p>
@@ -1154,7 +1158,7 @@
           <a:p>
             <a:fld id="{0F076D73-6AE3-5240-8615-7A42779E2E4B}" type="datetimeFigureOut">
               <a:rPr lang="en-US" smtClean="0"/>
-              <a:t>6/25/18</a:t>
+              <a:t>6/28/18</a:t>
             </a:fld>
             <a:endParaRPr lang="en-US"/>
           </a:p>
@@ -1419,7 +1423,7 @@
           <a:p>
             <a:fld id="{0F076D73-6AE3-5240-8615-7A42779E2E4B}" type="datetimeFigureOut">
               <a:rPr lang="en-US" smtClean="0"/>
-              <a:t>6/25/18</a:t>
+              <a:t>6/28/18</a:t>
             </a:fld>
             <a:endParaRPr lang="en-US"/>
           </a:p>
@@ -1831,7 +1835,7 @@
           <a:p>
             <a:fld id="{0F076D73-6AE3-5240-8615-7A42779E2E4B}" type="datetimeFigureOut">
               <a:rPr lang="en-US" smtClean="0"/>
-              <a:t>6/25/18</a:t>
+              <a:t>6/28/18</a:t>
             </a:fld>
             <a:endParaRPr lang="en-US"/>
           </a:p>
@@ -1972,7 +1976,7 @@
           <a:p>
             <a:fld id="{0F076D73-6AE3-5240-8615-7A42779E2E4B}" type="datetimeFigureOut">
               <a:rPr lang="en-US" smtClean="0"/>
-              <a:t>6/25/18</a:t>
+              <a:t>6/28/18</a:t>
             </a:fld>
             <a:endParaRPr lang="en-US"/>
           </a:p>
@@ -2085,7 +2089,7 @@
           <a:p>
             <a:fld id="{0F076D73-6AE3-5240-8615-7A42779E2E4B}" type="datetimeFigureOut">
               <a:rPr lang="en-US" smtClean="0"/>
-              <a:t>6/25/18</a:t>
+              <a:t>6/28/18</a:t>
             </a:fld>
             <a:endParaRPr lang="en-US"/>
           </a:p>
@@ -2396,7 +2400,7 @@
           <a:p>
             <a:fld id="{0F076D73-6AE3-5240-8615-7A42779E2E4B}" type="datetimeFigureOut">
               <a:rPr lang="en-US" smtClean="0"/>
-              <a:t>6/25/18</a:t>
+              <a:t>6/28/18</a:t>
             </a:fld>
             <a:endParaRPr lang="en-US"/>
           </a:p>
@@ -2684,7 +2688,7 @@
           <a:p>
             <a:fld id="{0F076D73-6AE3-5240-8615-7A42779E2E4B}" type="datetimeFigureOut">
               <a:rPr lang="en-US" smtClean="0"/>
-              <a:t>6/25/18</a:t>
+              <a:t>6/28/18</a:t>
             </a:fld>
             <a:endParaRPr lang="en-US"/>
           </a:p>
@@ -2925,7 +2929,7 @@
           <a:p>
             <a:fld id="{0F076D73-6AE3-5240-8615-7A42779E2E4B}" type="datetimeFigureOut">
               <a:rPr lang="en-US" smtClean="0"/>
-              <a:t>6/25/18</a:t>
+              <a:t>6/28/18</a:t>
             </a:fld>
             <a:endParaRPr lang="en-US"/>
           </a:p>
@@ -3328,6 +3332,558 @@
 <file path=ppt/slides/slide1.xml><?xml version="1.0" encoding="utf-8"?>
 <p:sld xmlns:a="http://schemas.openxmlformats.org/drawingml/2006/main" xmlns:r="http://schemas.openxmlformats.org/officeDocument/2006/relationships" xmlns:p="http://schemas.openxmlformats.org/presentationml/2006/main">
   <p:cSld>
+    <p:spTree>
+      <p:nvGrpSpPr>
+        <p:cNvPr id="1" name=""/>
+        <p:cNvGrpSpPr/>
+        <p:nvPr/>
+      </p:nvGrpSpPr>
+      <p:grpSpPr>
+        <a:xfrm>
+          <a:off x="0" y="0"/>
+          <a:ext cx="0" cy="0"/>
+          <a:chOff x="0" y="0"/>
+          <a:chExt cx="0" cy="0"/>
+        </a:xfrm>
+      </p:grpSpPr>
+      <p:sp>
+        <p:nvSpPr>
+          <p:cNvPr id="2" name="Title 1" title="TitleBox">
+            <a:extLst>
+              <a:ext uri="{FF2B5EF4-FFF2-40B4-BE49-F238E27FC236}">
+                <a16:creationId xmlns:a16="http://schemas.microsoft.com/office/drawing/2014/main" id="{998C3613-5C3A-E54A-B913-D5B87C3595D9}"/>
+              </a:ext>
+            </a:extLst>
+          </p:cNvPr>
+          <p:cNvSpPr>
+            <a:spLocks noGrp="1"/>
+          </p:cNvSpPr>
+          <p:nvPr>
+            <p:ph type="title"/>
+          </p:nvPr>
+        </p:nvSpPr>
+        <p:spPr/>
+        <p:txBody>
+          <a:bodyPr/>
+          <a:lstStyle/>
+          <a:p>
+            <a:r>
+              <a:rPr lang="en-US" dirty="0"/>
+              <a:t>Shapes</a:t>
+            </a:r>
+          </a:p>
+        </p:txBody>
+      </p:sp>
+      <p:sp>
+        <p:nvSpPr>
+          <p:cNvPr id="4" name="Rectangle 3" title="RectangleShape">
+            <a:extLst>
+              <a:ext uri="{FF2B5EF4-FFF2-40B4-BE49-F238E27FC236}">
+                <a16:creationId xmlns:a16="http://schemas.microsoft.com/office/drawing/2014/main" id="{ED8AE9A4-1E74-0E45-AAB0-C5F57FC93E14}"/>
+              </a:ext>
+            </a:extLst>
+          </p:cNvPr>
+          <p:cNvSpPr/>
+          <p:nvPr/>
+        </p:nvSpPr>
+        <p:spPr>
+          <a:xfrm>
+            <a:off x="838200" y="1690688"/>
+            <a:ext cx="997600" cy="731209"/>
+          </a:xfrm>
+          <a:prstGeom prst="rect">
+            <a:avLst/>
+          </a:prstGeom>
+        </p:spPr>
+        <p:style>
+          <a:lnRef idx="2">
+            <a:schemeClr val="accent1">
+              <a:shade val="50000"/>
+            </a:schemeClr>
+          </a:lnRef>
+          <a:fillRef idx="1">
+            <a:schemeClr val="accent1"/>
+          </a:fillRef>
+          <a:effectRef idx="0">
+            <a:schemeClr val="accent1"/>
+          </a:effectRef>
+          <a:fontRef idx="minor">
+            <a:schemeClr val="lt1"/>
+          </a:fontRef>
+        </p:style>
+        <p:txBody>
+          <a:bodyPr rtlCol="0" anchor="ctr"/>
+          <a:lstStyle/>
+          <a:p>
+            <a:pPr algn="ctr"/>
+            <a:endParaRPr lang="en-US" dirty="0"/>
+          </a:p>
+        </p:txBody>
+      </p:sp>
+      <p:sp>
+        <p:nvSpPr>
+          <p:cNvPr id="5" name="Oval 4" title="CircleShape">
+            <a:extLst>
+              <a:ext uri="{FF2B5EF4-FFF2-40B4-BE49-F238E27FC236}">
+                <a16:creationId xmlns:a16="http://schemas.microsoft.com/office/drawing/2014/main" id="{C1D7C131-7B74-714E-9274-9211AD7F38F1}"/>
+              </a:ext>
+            </a:extLst>
+          </p:cNvPr>
+          <p:cNvSpPr/>
+          <p:nvPr/>
+        </p:nvSpPr>
+        <p:spPr>
+          <a:xfrm>
+            <a:off x="2349062" y="1607853"/>
+            <a:ext cx="896880" cy="896880"/>
+          </a:xfrm>
+          <a:prstGeom prst="ellipse">
+            <a:avLst/>
+          </a:prstGeom>
+        </p:spPr>
+        <p:style>
+          <a:lnRef idx="2">
+            <a:schemeClr val="accent1">
+              <a:shade val="50000"/>
+            </a:schemeClr>
+          </a:lnRef>
+          <a:fillRef idx="1">
+            <a:schemeClr val="accent1"/>
+          </a:fillRef>
+          <a:effectRef idx="0">
+            <a:schemeClr val="accent1"/>
+          </a:effectRef>
+          <a:fontRef idx="minor">
+            <a:schemeClr val="lt1"/>
+          </a:fontRef>
+        </p:style>
+        <p:txBody>
+          <a:bodyPr rtlCol="0" anchor="ctr"/>
+          <a:lstStyle/>
+          <a:p>
+            <a:pPr algn="ctr"/>
+            <a:endParaRPr lang="en-US"/>
+          </a:p>
+        </p:txBody>
+      </p:sp>
+      <p:sp>
+        <p:nvSpPr>
+          <p:cNvPr id="6" name="Rounded Rectangle 5" title="RoundedRectangle">
+            <a:extLst>
+              <a:ext uri="{FF2B5EF4-FFF2-40B4-BE49-F238E27FC236}">
+                <a16:creationId xmlns:a16="http://schemas.microsoft.com/office/drawing/2014/main" id="{374EDF48-6E88-1649-92E1-7B60091DBE6A}"/>
+              </a:ext>
+            </a:extLst>
+          </p:cNvPr>
+          <p:cNvSpPr/>
+          <p:nvPr/>
+        </p:nvSpPr>
+        <p:spPr>
+          <a:xfrm>
+            <a:off x="3759204" y="1621198"/>
+            <a:ext cx="1331314" cy="870188"/>
+          </a:xfrm>
+          <a:prstGeom prst="roundRect">
+            <a:avLst/>
+          </a:prstGeom>
+        </p:spPr>
+        <p:style>
+          <a:lnRef idx="2">
+            <a:schemeClr val="accent1">
+              <a:shade val="50000"/>
+            </a:schemeClr>
+          </a:lnRef>
+          <a:fillRef idx="1">
+            <a:schemeClr val="accent1"/>
+          </a:fillRef>
+          <a:effectRef idx="0">
+            <a:schemeClr val="accent1"/>
+          </a:effectRef>
+          <a:fontRef idx="minor">
+            <a:schemeClr val="lt1"/>
+          </a:fontRef>
+        </p:style>
+        <p:txBody>
+          <a:bodyPr rtlCol="0" anchor="ctr"/>
+          <a:lstStyle/>
+          <a:p>
+            <a:pPr algn="ctr"/>
+            <a:endParaRPr lang="en-US"/>
+          </a:p>
+        </p:txBody>
+      </p:sp>
+      <p:sp>
+        <p:nvSpPr>
+          <p:cNvPr id="7" name="Triangle 6" title="Triangle">
+            <a:extLst>
+              <a:ext uri="{FF2B5EF4-FFF2-40B4-BE49-F238E27FC236}">
+                <a16:creationId xmlns:a16="http://schemas.microsoft.com/office/drawing/2014/main" id="{073B1A53-10E1-684C-A9C7-B2C51F21E2B5}"/>
+              </a:ext>
+            </a:extLst>
+          </p:cNvPr>
+          <p:cNvSpPr/>
+          <p:nvPr/>
+        </p:nvSpPr>
+        <p:spPr>
+          <a:xfrm>
+            <a:off x="5607269" y="1621198"/>
+            <a:ext cx="977462" cy="842640"/>
+          </a:xfrm>
+          <a:prstGeom prst="triangle">
+            <a:avLst/>
+          </a:prstGeom>
+        </p:spPr>
+        <p:style>
+          <a:lnRef idx="2">
+            <a:schemeClr val="accent1">
+              <a:shade val="50000"/>
+            </a:schemeClr>
+          </a:lnRef>
+          <a:fillRef idx="1">
+            <a:schemeClr val="accent1"/>
+          </a:fillRef>
+          <a:effectRef idx="0">
+            <a:schemeClr val="accent1"/>
+          </a:effectRef>
+          <a:fontRef idx="minor">
+            <a:schemeClr val="lt1"/>
+          </a:fontRef>
+        </p:style>
+        <p:txBody>
+          <a:bodyPr rtlCol="0" anchor="ctr"/>
+          <a:lstStyle/>
+          <a:p>
+            <a:pPr algn="ctr"/>
+            <a:endParaRPr lang="en-US"/>
+          </a:p>
+        </p:txBody>
+      </p:sp>
+      <p:sp>
+        <p:nvSpPr>
+          <p:cNvPr id="10" name="Right Triangle 9" title="RightTriangle">
+            <a:extLst>
+              <a:ext uri="{FF2B5EF4-FFF2-40B4-BE49-F238E27FC236}">
+                <a16:creationId xmlns:a16="http://schemas.microsoft.com/office/drawing/2014/main" id="{5EE7855E-A97E-044B-8483-EE2D7FD53443}"/>
+              </a:ext>
+            </a:extLst>
+          </p:cNvPr>
+          <p:cNvSpPr/>
+          <p:nvPr/>
+        </p:nvSpPr>
+        <p:spPr>
+          <a:xfrm>
+            <a:off x="7173310" y="1621198"/>
+            <a:ext cx="842640" cy="842640"/>
+          </a:xfrm>
+          <a:prstGeom prst="rtTriangle">
+            <a:avLst/>
+          </a:prstGeom>
+        </p:spPr>
+        <p:style>
+          <a:lnRef idx="2">
+            <a:schemeClr val="accent1">
+              <a:shade val="50000"/>
+            </a:schemeClr>
+          </a:lnRef>
+          <a:fillRef idx="1">
+            <a:schemeClr val="accent1"/>
+          </a:fillRef>
+          <a:effectRef idx="0">
+            <a:schemeClr val="accent1"/>
+          </a:effectRef>
+          <a:fontRef idx="minor">
+            <a:schemeClr val="lt1"/>
+          </a:fontRef>
+        </p:style>
+        <p:txBody>
+          <a:bodyPr rtlCol="0" anchor="ctr"/>
+          <a:lstStyle/>
+          <a:p>
+            <a:pPr algn="ctr"/>
+            <a:endParaRPr lang="en-US"/>
+          </a:p>
+        </p:txBody>
+      </p:sp>
+      <p:sp>
+        <p:nvSpPr>
+          <p:cNvPr id="11" name="Octagon 10" title="Octagon">
+            <a:extLst>
+              <a:ext uri="{FF2B5EF4-FFF2-40B4-BE49-F238E27FC236}">
+                <a16:creationId xmlns:a16="http://schemas.microsoft.com/office/drawing/2014/main" id="{E99CFDC1-6400-F548-8009-268ABB027EB2}"/>
+              </a:ext>
+            </a:extLst>
+          </p:cNvPr>
+          <p:cNvSpPr/>
+          <p:nvPr/>
+        </p:nvSpPr>
+        <p:spPr>
+          <a:xfrm>
+            <a:off x="8623738" y="1481959"/>
+            <a:ext cx="1022774" cy="1022774"/>
+          </a:xfrm>
+          <a:prstGeom prst="octagon">
+            <a:avLst/>
+          </a:prstGeom>
+        </p:spPr>
+        <p:style>
+          <a:lnRef idx="2">
+            <a:schemeClr val="accent1">
+              <a:shade val="50000"/>
+            </a:schemeClr>
+          </a:lnRef>
+          <a:fillRef idx="1">
+            <a:schemeClr val="accent1"/>
+          </a:fillRef>
+          <a:effectRef idx="0">
+            <a:schemeClr val="accent1"/>
+          </a:effectRef>
+          <a:fontRef idx="minor">
+            <a:schemeClr val="lt1"/>
+          </a:fontRef>
+        </p:style>
+        <p:txBody>
+          <a:bodyPr rtlCol="0" anchor="ctr"/>
+          <a:lstStyle/>
+          <a:p>
+            <a:pPr algn="ctr"/>
+            <a:endParaRPr lang="en-US"/>
+          </a:p>
+        </p:txBody>
+      </p:sp>
+      <p:sp>
+        <p:nvSpPr>
+          <p:cNvPr id="12" name="Frame 11" title="CustomFrame">
+            <a:extLst>
+              <a:ext uri="{FF2B5EF4-FFF2-40B4-BE49-F238E27FC236}">
+                <a16:creationId xmlns:a16="http://schemas.microsoft.com/office/drawing/2014/main" id="{72F8F642-4FE2-4C47-824A-F991672A29BC}"/>
+              </a:ext>
+            </a:extLst>
+          </p:cNvPr>
+          <p:cNvSpPr/>
+          <p:nvPr/>
+        </p:nvSpPr>
+        <p:spPr>
+          <a:xfrm>
+            <a:off x="10350991" y="1443428"/>
+            <a:ext cx="1198179" cy="1198179"/>
+          </a:xfrm>
+          <a:prstGeom prst="frame">
+            <a:avLst>
+              <a:gd name="adj1" fmla="val 24342"/>
+            </a:avLst>
+          </a:prstGeom>
+        </p:spPr>
+        <p:style>
+          <a:lnRef idx="2">
+            <a:schemeClr val="accent1">
+              <a:shade val="50000"/>
+            </a:schemeClr>
+          </a:lnRef>
+          <a:fillRef idx="1">
+            <a:schemeClr val="accent1"/>
+          </a:fillRef>
+          <a:effectRef idx="0">
+            <a:schemeClr val="accent1"/>
+          </a:effectRef>
+          <a:fontRef idx="minor">
+            <a:schemeClr val="lt1"/>
+          </a:fontRef>
+        </p:style>
+        <p:txBody>
+          <a:bodyPr rtlCol="0" anchor="ctr"/>
+          <a:lstStyle/>
+          <a:p>
+            <a:pPr algn="ctr"/>
+            <a:endParaRPr lang="en-US">
+              <a:solidFill>
+                <a:schemeClr val="tx1"/>
+              </a:solidFill>
+            </a:endParaRPr>
+          </a:p>
+        </p:txBody>
+      </p:sp>
+      <p:sp>
+        <p:nvSpPr>
+          <p:cNvPr id="14" name="Rectangle 13">
+            <a:extLst>
+              <a:ext uri="{FF2B5EF4-FFF2-40B4-BE49-F238E27FC236}">
+                <a16:creationId xmlns:a16="http://schemas.microsoft.com/office/drawing/2014/main" id="{D0C016F1-AF3A-3D47-A301-1E20B1F6F424}"/>
+              </a:ext>
+            </a:extLst>
+          </p:cNvPr>
+          <p:cNvSpPr/>
+          <p:nvPr/>
+        </p:nvSpPr>
+        <p:spPr>
+          <a:xfrm>
+            <a:off x="838200" y="3016251"/>
+            <a:ext cx="997600" cy="731209"/>
+          </a:xfrm>
+          <a:prstGeom prst="rect">
+            <a:avLst/>
+          </a:prstGeom>
+          <a:solidFill>
+            <a:srgbClr val="F44D6A"/>
+          </a:solidFill>
+        </p:spPr>
+        <p:style>
+          <a:lnRef idx="2">
+            <a:schemeClr val="accent1">
+              <a:shade val="50000"/>
+            </a:schemeClr>
+          </a:lnRef>
+          <a:fillRef idx="1">
+            <a:schemeClr val="accent1"/>
+          </a:fillRef>
+          <a:effectRef idx="0">
+            <a:schemeClr val="accent1"/>
+          </a:effectRef>
+          <a:fontRef idx="minor">
+            <a:schemeClr val="lt1"/>
+          </a:fontRef>
+        </p:style>
+        <p:txBody>
+          <a:bodyPr rtlCol="0" anchor="ctr"/>
+          <a:lstStyle/>
+          <a:p>
+            <a:pPr algn="ctr"/>
+            <a:endParaRPr lang="en-US" dirty="0"/>
+          </a:p>
+        </p:txBody>
+      </p:sp>
+      <p:sp>
+        <p:nvSpPr>
+          <p:cNvPr id="15" name="Oval 14" title="CircleShape">
+            <a:extLst>
+              <a:ext uri="{FF2B5EF4-FFF2-40B4-BE49-F238E27FC236}">
+                <a16:creationId xmlns:a16="http://schemas.microsoft.com/office/drawing/2014/main" id="{0B00EFF6-4AAC-8A40-900C-E9C6E26F8072}"/>
+              </a:ext>
+            </a:extLst>
+          </p:cNvPr>
+          <p:cNvSpPr/>
+          <p:nvPr/>
+        </p:nvSpPr>
+        <p:spPr>
+          <a:xfrm>
+            <a:off x="2375201" y="2933415"/>
+            <a:ext cx="896880" cy="896880"/>
+          </a:xfrm>
+          <a:prstGeom prst="ellipse">
+            <a:avLst/>
+          </a:prstGeom>
+          <a:ln w="38100">
+            <a:solidFill>
+              <a:srgbClr val="F44D6A"/>
+            </a:solidFill>
+          </a:ln>
+        </p:spPr>
+        <p:style>
+          <a:lnRef idx="2">
+            <a:schemeClr val="accent1">
+              <a:shade val="50000"/>
+            </a:schemeClr>
+          </a:lnRef>
+          <a:fillRef idx="1">
+            <a:schemeClr val="accent1"/>
+          </a:fillRef>
+          <a:effectRef idx="0">
+            <a:schemeClr val="accent1"/>
+          </a:effectRef>
+          <a:fontRef idx="minor">
+            <a:schemeClr val="lt1"/>
+          </a:fontRef>
+        </p:style>
+        <p:txBody>
+          <a:bodyPr rtlCol="0" anchor="ctr"/>
+          <a:lstStyle/>
+          <a:p>
+            <a:pPr algn="ctr"/>
+            <a:endParaRPr lang="en-US"/>
+          </a:p>
+        </p:txBody>
+      </p:sp>
+      <p:sp>
+        <p:nvSpPr>
+          <p:cNvPr id="16" name="Rounded Rectangle 15" title="RoundedRectangle">
+            <a:extLst>
+              <a:ext uri="{FF2B5EF4-FFF2-40B4-BE49-F238E27FC236}">
+                <a16:creationId xmlns:a16="http://schemas.microsoft.com/office/drawing/2014/main" id="{2C2FA61B-3B18-4B45-88B6-F0DA6F135B13}"/>
+              </a:ext>
+            </a:extLst>
+          </p:cNvPr>
+          <p:cNvSpPr/>
+          <p:nvPr/>
+        </p:nvSpPr>
+        <p:spPr>
+          <a:xfrm>
+            <a:off x="3754822" y="2933415"/>
+            <a:ext cx="1331314" cy="870188"/>
+          </a:xfrm>
+          <a:prstGeom prst="roundRect">
+            <a:avLst/>
+          </a:prstGeom>
+          <a:solidFill>
+            <a:schemeClr val="accent1">
+              <a:alpha val="0"/>
+            </a:schemeClr>
+          </a:solidFill>
+        </p:spPr>
+        <p:style>
+          <a:lnRef idx="2">
+            <a:schemeClr val="accent1">
+              <a:shade val="50000"/>
+            </a:schemeClr>
+          </a:lnRef>
+          <a:fillRef idx="1">
+            <a:schemeClr val="accent1"/>
+          </a:fillRef>
+          <a:effectRef idx="0">
+            <a:schemeClr val="accent1"/>
+          </a:effectRef>
+          <a:fontRef idx="minor">
+            <a:schemeClr val="lt1"/>
+          </a:fontRef>
+        </p:style>
+        <p:txBody>
+          <a:bodyPr rtlCol="0" anchor="ctr"/>
+          <a:lstStyle/>
+          <a:p>
+            <a:pPr algn="ctr"/>
+            <a:r>
+              <a:rPr lang="en-US" sz="1600" dirty="0">
+                <a:ln w="0"/>
+                <a:solidFill>
+                  <a:schemeClr val="tx1"/>
+                </a:solidFill>
+                <a:effectLst>
+                  <a:outerShdw blurRad="38100" dist="19050" dir="2700000" algn="tl" rotWithShape="0">
+                    <a:schemeClr val="dk1">
+                      <a:alpha val="40000"/>
+                    </a:schemeClr>
+                  </a:outerShdw>
+                </a:effectLst>
+              </a:rPr>
+              <a:t>Transparent</a:t>
+            </a:r>
+          </a:p>
+        </p:txBody>
+      </p:sp>
+    </p:spTree>
+    <p:extLst>
+      <p:ext uri="{BB962C8B-B14F-4D97-AF65-F5344CB8AC3E}">
+        <p14:creationId xmlns:p14="http://schemas.microsoft.com/office/powerpoint/2010/main" val="3196706781"/>
+      </p:ext>
+    </p:extLst>
+  </p:cSld>
+  <p:clrMapOvr>
+    <a:masterClrMapping/>
+  </p:clrMapOvr>
+</p:sld>
+</file>
+
+<file path=ppt/slides/slide2.xml><?xml version="1.0" encoding="utf-8"?>
+<p:sld xmlns:a="http://schemas.openxmlformats.org/drawingml/2006/main" xmlns:r="http://schemas.openxmlformats.org/officeDocument/2006/relationships" xmlns:p="http://schemas.openxmlformats.org/presentationml/2006/main">
+  <p:cSld>
     <p:bg>
       <p:bgPr>
         <a:pattFill prst="pct5">
@@ -3538,6 +4094,688 @@
     <p:extLst>
       <p:ext uri="{BB962C8B-B14F-4D97-AF65-F5344CB8AC3E}">
         <p14:creationId xmlns:p14="http://schemas.microsoft.com/office/powerpoint/2010/main" val="4211102391"/>
+      </p:ext>
+    </p:extLst>
+  </p:cSld>
+  <p:clrMapOvr>
+    <a:masterClrMapping/>
+  </p:clrMapOvr>
+</p:sld>
+</file>
+
+<file path=ppt/slides/slide3.xml><?xml version="1.0" encoding="utf-8"?>
+<p:sld xmlns:a="http://schemas.openxmlformats.org/drawingml/2006/main" xmlns:r="http://schemas.openxmlformats.org/officeDocument/2006/relationships" xmlns:p="http://schemas.openxmlformats.org/presentationml/2006/main">
+  <p:cSld>
+    <p:spTree>
+      <p:nvGrpSpPr>
+        <p:cNvPr id="1" name=""/>
+        <p:cNvGrpSpPr/>
+        <p:nvPr/>
+      </p:nvGrpSpPr>
+      <p:grpSpPr>
+        <a:xfrm>
+          <a:off x="0" y="0"/>
+          <a:ext cx="0" cy="0"/>
+          <a:chOff x="0" y="0"/>
+          <a:chExt cx="0" cy="0"/>
+        </a:xfrm>
+      </p:grpSpPr>
+      <p:sp>
+        <p:nvSpPr>
+          <p:cNvPr id="4" name="Title 1" title="TitleBox">
+            <a:extLst>
+              <a:ext uri="{FF2B5EF4-FFF2-40B4-BE49-F238E27FC236}">
+                <a16:creationId xmlns:a16="http://schemas.microsoft.com/office/drawing/2014/main" id="{ED3D1046-767B-6349-9F8F-FB579E293060}"/>
+              </a:ext>
+            </a:extLst>
+          </p:cNvPr>
+          <p:cNvSpPr>
+            <a:spLocks noGrp="1"/>
+          </p:cNvSpPr>
+          <p:nvPr>
+            <p:ph type="title"/>
+          </p:nvPr>
+        </p:nvSpPr>
+        <p:spPr>
+          <a:xfrm>
+            <a:off x="838200" y="365125"/>
+            <a:ext cx="10515600" cy="1325563"/>
+          </a:xfrm>
+        </p:spPr>
+        <p:txBody>
+          <a:bodyPr/>
+          <a:lstStyle/>
+          <a:p>
+            <a:r>
+              <a:rPr lang="en-US" dirty="0"/>
+              <a:t>Lines</a:t>
+            </a:r>
+          </a:p>
+        </p:txBody>
+      </p:sp>
+      <p:cxnSp>
+        <p:nvCxnSpPr>
+          <p:cNvPr id="6" name="Straight Connector 5" title="StraightLine">
+            <a:extLst>
+              <a:ext uri="{FF2B5EF4-FFF2-40B4-BE49-F238E27FC236}">
+                <a16:creationId xmlns:a16="http://schemas.microsoft.com/office/drawing/2014/main" id="{FA98F6EC-7FCB-D949-9675-D63BE6C2F0A1}"/>
+              </a:ext>
+            </a:extLst>
+          </p:cNvPr>
+          <p:cNvCxnSpPr/>
+          <p:nvPr/>
+        </p:nvCxnSpPr>
+        <p:spPr>
+          <a:xfrm>
+            <a:off x="838200" y="1891862"/>
+            <a:ext cx="3008586" cy="0"/>
+          </a:xfrm>
+          <a:prstGeom prst="line">
+            <a:avLst/>
+          </a:prstGeom>
+        </p:spPr>
+        <p:style>
+          <a:lnRef idx="1">
+            <a:schemeClr val="dk1"/>
+          </a:lnRef>
+          <a:fillRef idx="0">
+            <a:schemeClr val="dk1"/>
+          </a:fillRef>
+          <a:effectRef idx="0">
+            <a:schemeClr val="dk1"/>
+          </a:effectRef>
+          <a:fontRef idx="minor">
+            <a:schemeClr val="tx1"/>
+          </a:fontRef>
+        </p:style>
+      </p:cxnSp>
+      <p:cxnSp>
+        <p:nvCxnSpPr>
+          <p:cNvPr id="7" name="Straight Connector 6" title="ThickLine">
+            <a:extLst>
+              <a:ext uri="{FF2B5EF4-FFF2-40B4-BE49-F238E27FC236}">
+                <a16:creationId xmlns:a16="http://schemas.microsoft.com/office/drawing/2014/main" id="{88D5B12B-29DC-3E4A-8B27-89D609FEBDC9}"/>
+              </a:ext>
+            </a:extLst>
+          </p:cNvPr>
+          <p:cNvCxnSpPr/>
+          <p:nvPr/>
+        </p:nvCxnSpPr>
+        <p:spPr>
+          <a:xfrm>
+            <a:off x="838200" y="2501462"/>
+            <a:ext cx="3008586" cy="0"/>
+          </a:xfrm>
+          <a:prstGeom prst="line">
+            <a:avLst/>
+          </a:prstGeom>
+          <a:ln w="57150"/>
+        </p:spPr>
+        <p:style>
+          <a:lnRef idx="1">
+            <a:schemeClr val="dk1"/>
+          </a:lnRef>
+          <a:fillRef idx="0">
+            <a:schemeClr val="dk1"/>
+          </a:fillRef>
+          <a:effectRef idx="0">
+            <a:schemeClr val="dk1"/>
+          </a:effectRef>
+          <a:fontRef idx="minor">
+            <a:schemeClr val="tx1"/>
+          </a:fontRef>
+        </p:style>
+      </p:cxnSp>
+      <p:cxnSp>
+        <p:nvCxnSpPr>
+          <p:cNvPr id="8" name="Straight Connector 7" title="DottedLine">
+            <a:extLst>
+              <a:ext uri="{FF2B5EF4-FFF2-40B4-BE49-F238E27FC236}">
+                <a16:creationId xmlns:a16="http://schemas.microsoft.com/office/drawing/2014/main" id="{D69FE2DF-1DA5-EF40-92EA-7EEDF8134B17}"/>
+              </a:ext>
+            </a:extLst>
+          </p:cNvPr>
+          <p:cNvCxnSpPr/>
+          <p:nvPr/>
+        </p:nvCxnSpPr>
+        <p:spPr>
+          <a:xfrm>
+            <a:off x="838200" y="3111062"/>
+            <a:ext cx="3008586" cy="0"/>
+          </a:xfrm>
+          <a:prstGeom prst="line">
+            <a:avLst/>
+          </a:prstGeom>
+          <a:ln>
+            <a:prstDash val="sysDash"/>
+          </a:ln>
+        </p:spPr>
+        <p:style>
+          <a:lnRef idx="1">
+            <a:schemeClr val="dk1"/>
+          </a:lnRef>
+          <a:fillRef idx="0">
+            <a:schemeClr val="dk1"/>
+          </a:fillRef>
+          <a:effectRef idx="0">
+            <a:schemeClr val="dk1"/>
+          </a:effectRef>
+          <a:fontRef idx="minor">
+            <a:schemeClr val="tx1"/>
+          </a:fontRef>
+        </p:style>
+      </p:cxnSp>
+    </p:spTree>
+    <p:extLst>
+      <p:ext uri="{BB962C8B-B14F-4D97-AF65-F5344CB8AC3E}">
+        <p14:creationId xmlns:p14="http://schemas.microsoft.com/office/powerpoint/2010/main" val="2388631457"/>
+      </p:ext>
+    </p:extLst>
+  </p:cSld>
+  <p:clrMapOvr>
+    <a:masterClrMapping/>
+  </p:clrMapOvr>
+</p:sld>
+</file>
+
+<file path=ppt/slides/slide4.xml><?xml version="1.0" encoding="utf-8"?>
+<p:sld xmlns:a="http://schemas.openxmlformats.org/drawingml/2006/main" xmlns:r="http://schemas.openxmlformats.org/officeDocument/2006/relationships" xmlns:p="http://schemas.openxmlformats.org/presentationml/2006/main">
+  <p:cSld>
+    <p:spTree>
+      <p:nvGrpSpPr>
+        <p:cNvPr id="1" name=""/>
+        <p:cNvGrpSpPr/>
+        <p:nvPr/>
+      </p:nvGrpSpPr>
+      <p:grpSpPr>
+        <a:xfrm>
+          <a:off x="0" y="0"/>
+          <a:ext cx="0" cy="0"/>
+          <a:chOff x="0" y="0"/>
+          <a:chExt cx="0" cy="0"/>
+        </a:xfrm>
+      </p:grpSpPr>
+      <p:sp>
+        <p:nvSpPr>
+          <p:cNvPr id="2" name="Title 1">
+            <a:extLst>
+              <a:ext uri="{FF2B5EF4-FFF2-40B4-BE49-F238E27FC236}">
+                <a16:creationId xmlns:a16="http://schemas.microsoft.com/office/drawing/2014/main" id="{89A6F31D-13F0-C844-9DB8-8FF975EB00B5}"/>
+              </a:ext>
+            </a:extLst>
+          </p:cNvPr>
+          <p:cNvSpPr>
+            <a:spLocks noGrp="1"/>
+          </p:cNvSpPr>
+          <p:nvPr>
+            <p:ph type="title"/>
+          </p:nvPr>
+        </p:nvSpPr>
+        <p:spPr/>
+        <p:txBody>
+          <a:bodyPr/>
+          <a:lstStyle/>
+          <a:p>
+            <a:r>
+              <a:rPr lang="en-US" dirty="0"/>
+              <a:t>Icons</a:t>
+            </a:r>
+          </a:p>
+        </p:txBody>
+      </p:sp>
+      <p:pic>
+        <p:nvPicPr>
+          <p:cNvPr id="5" name="Graphic 4" descr="Man">
+            <a:extLst>
+              <a:ext uri="{FF2B5EF4-FFF2-40B4-BE49-F238E27FC236}">
+                <a16:creationId xmlns:a16="http://schemas.microsoft.com/office/drawing/2014/main" id="{F4D98C24-95BC-2B46-84DE-9E4C9C866B97}"/>
+              </a:ext>
+            </a:extLst>
+          </p:cNvPr>
+          <p:cNvPicPr>
+            <a:picLocks noChangeAspect="1"/>
+          </p:cNvPicPr>
+          <p:nvPr/>
+        </p:nvPicPr>
+        <p:blipFill>
+          <a:blip r:embed="rId2">
+            <a:extLst>
+              <a:ext uri="{96DAC541-7B7A-43D3-8B79-37D633B846F1}">
+                <asvg:svgBlip xmlns:asvg="http://schemas.microsoft.com/office/drawing/2016/SVG/main" r:embed="rId3"/>
+              </a:ext>
+            </a:extLst>
+          </a:blip>
+          <a:stretch>
+            <a:fillRect/>
+          </a:stretch>
+        </p:blipFill>
+        <p:spPr>
+          <a:xfrm>
+            <a:off x="9116057" y="1930064"/>
+            <a:ext cx="1982007" cy="1982007"/>
+          </a:xfrm>
+          <a:prstGeom prst="rect">
+            <a:avLst/>
+          </a:prstGeom>
+        </p:spPr>
+      </p:pic>
+      <p:pic>
+        <p:nvPicPr>
+          <p:cNvPr id="7" name="Graphic 6" descr="Computer">
+            <a:extLst>
+              <a:ext uri="{FF2B5EF4-FFF2-40B4-BE49-F238E27FC236}">
+                <a16:creationId xmlns:a16="http://schemas.microsoft.com/office/drawing/2014/main" id="{CF04EFBC-29D7-8E40-BB63-44DF5F020F70}"/>
+              </a:ext>
+            </a:extLst>
+          </p:cNvPr>
+          <p:cNvPicPr>
+            <a:picLocks noChangeAspect="1"/>
+          </p:cNvPicPr>
+          <p:nvPr/>
+        </p:nvPicPr>
+        <p:blipFill>
+          <a:blip r:embed="rId4">
+            <a:extLst>
+              <a:ext uri="{96DAC541-7B7A-43D3-8B79-37D633B846F1}">
+                <asvg:svgBlip xmlns:asvg="http://schemas.microsoft.com/office/drawing/2016/SVG/main" r:embed="rId5"/>
+              </a:ext>
+            </a:extLst>
+          </a:blip>
+          <a:stretch>
+            <a:fillRect/>
+          </a:stretch>
+        </p:blipFill>
+        <p:spPr>
+          <a:xfrm>
+            <a:off x="6315800" y="1612455"/>
+            <a:ext cx="2544522" cy="2544522"/>
+          </a:xfrm>
+          <a:prstGeom prst="rect">
+            <a:avLst/>
+          </a:prstGeom>
+        </p:spPr>
+      </p:pic>
+      <p:pic>
+        <p:nvPicPr>
+          <p:cNvPr id="9" name="Graphic 8" descr="Laptop">
+            <a:extLst>
+              <a:ext uri="{FF2B5EF4-FFF2-40B4-BE49-F238E27FC236}">
+                <a16:creationId xmlns:a16="http://schemas.microsoft.com/office/drawing/2014/main" id="{7F3558D3-55DD-774B-8083-4B5EA192C9F0}"/>
+              </a:ext>
+            </a:extLst>
+          </p:cNvPr>
+          <p:cNvPicPr>
+            <a:picLocks noChangeAspect="1"/>
+          </p:cNvPicPr>
+          <p:nvPr/>
+        </p:nvPicPr>
+        <p:blipFill>
+          <a:blip r:embed="rId6">
+            <a:extLst>
+              <a:ext uri="{96DAC541-7B7A-43D3-8B79-37D633B846F1}">
+                <asvg:svgBlip xmlns:asvg="http://schemas.microsoft.com/office/drawing/2016/SVG/main" r:embed="rId7"/>
+              </a:ext>
+            </a:extLst>
+          </a:blip>
+          <a:stretch>
+            <a:fillRect/>
+          </a:stretch>
+        </p:blipFill>
+        <p:spPr>
+          <a:xfrm>
+            <a:off x="1557824" y="1612455"/>
+            <a:ext cx="2538993" cy="2538993"/>
+          </a:xfrm>
+          <a:prstGeom prst="rect">
+            <a:avLst/>
+          </a:prstGeom>
+        </p:spPr>
+      </p:pic>
+      <p:pic>
+        <p:nvPicPr>
+          <p:cNvPr id="11" name="Graphic 10" descr="Monitor">
+            <a:extLst>
+              <a:ext uri="{FF2B5EF4-FFF2-40B4-BE49-F238E27FC236}">
+                <a16:creationId xmlns:a16="http://schemas.microsoft.com/office/drawing/2014/main" id="{382BEB7C-00E0-DE41-8897-66B0C7492A94}"/>
+              </a:ext>
+            </a:extLst>
+          </p:cNvPr>
+          <p:cNvPicPr>
+            <a:picLocks noChangeAspect="1"/>
+          </p:cNvPicPr>
+          <p:nvPr/>
+        </p:nvPicPr>
+        <p:blipFill>
+          <a:blip r:embed="rId8">
+            <a:extLst>
+              <a:ext uri="{96DAC541-7B7A-43D3-8B79-37D633B846F1}">
+                <asvg:svgBlip xmlns:asvg="http://schemas.microsoft.com/office/drawing/2016/SVG/main" r:embed="rId9"/>
+              </a:ext>
+            </a:extLst>
+          </a:blip>
+          <a:stretch>
+            <a:fillRect/>
+          </a:stretch>
+        </p:blipFill>
+        <p:spPr>
+          <a:xfrm>
+            <a:off x="3919031" y="1775230"/>
+            <a:ext cx="2213445" cy="2213445"/>
+          </a:xfrm>
+          <a:prstGeom prst="rect">
+            <a:avLst/>
+          </a:prstGeom>
+        </p:spPr>
+      </p:pic>
+    </p:spTree>
+    <p:extLst>
+      <p:ext uri="{BB962C8B-B14F-4D97-AF65-F5344CB8AC3E}">
+        <p14:creationId xmlns:p14="http://schemas.microsoft.com/office/powerpoint/2010/main" val="3941097532"/>
+      </p:ext>
+    </p:extLst>
+  </p:cSld>
+  <p:clrMapOvr>
+    <a:masterClrMapping/>
+  </p:clrMapOvr>
+</p:sld>
+</file>
+
+<file path=ppt/slides/slide5.xml><?xml version="1.0" encoding="utf-8"?>
+<p:sld xmlns:a="http://schemas.openxmlformats.org/drawingml/2006/main" xmlns:r="http://schemas.openxmlformats.org/officeDocument/2006/relationships" xmlns:p="http://schemas.openxmlformats.org/presentationml/2006/main">
+  <p:cSld>
+    <p:spTree>
+      <p:nvGrpSpPr>
+        <p:cNvPr id="1" name=""/>
+        <p:cNvGrpSpPr/>
+        <p:nvPr/>
+      </p:nvGrpSpPr>
+      <p:grpSpPr>
+        <a:xfrm>
+          <a:off x="0" y="0"/>
+          <a:ext cx="0" cy="0"/>
+          <a:chOff x="0" y="0"/>
+          <a:chExt cx="0" cy="0"/>
+        </a:xfrm>
+      </p:grpSpPr>
+      <p:sp>
+        <p:nvSpPr>
+          <p:cNvPr id="5" name="Rectangle 4">
+            <a:extLst>
+              <a:ext uri="{FF2B5EF4-FFF2-40B4-BE49-F238E27FC236}">
+                <a16:creationId xmlns:a16="http://schemas.microsoft.com/office/drawing/2014/main" id="{2970F5C4-A612-8B4B-8376-AE79F9FED3B8}"/>
+              </a:ext>
+            </a:extLst>
+          </p:cNvPr>
+          <p:cNvSpPr/>
+          <p:nvPr/>
+        </p:nvSpPr>
+        <p:spPr>
+          <a:xfrm>
+            <a:off x="0" y="0"/>
+            <a:ext cx="12192000" cy="1024759"/>
+          </a:xfrm>
+          <a:prstGeom prst="rect">
+            <a:avLst/>
+          </a:prstGeom>
+          <a:solidFill>
+            <a:schemeClr val="accent1">
+              <a:lumMod val="60000"/>
+              <a:lumOff val="40000"/>
+            </a:schemeClr>
+          </a:solidFill>
+          <a:ln>
+            <a:noFill/>
+          </a:ln>
+        </p:spPr>
+        <p:style>
+          <a:lnRef idx="2">
+            <a:schemeClr val="accent1">
+              <a:shade val="50000"/>
+            </a:schemeClr>
+          </a:lnRef>
+          <a:fillRef idx="1">
+            <a:schemeClr val="accent1"/>
+          </a:fillRef>
+          <a:effectRef idx="0">
+            <a:schemeClr val="accent1"/>
+          </a:effectRef>
+          <a:fontRef idx="minor">
+            <a:schemeClr val="lt1"/>
+          </a:fontRef>
+        </p:style>
+        <p:txBody>
+          <a:bodyPr rtlCol="0" anchor="ctr"/>
+          <a:lstStyle/>
+          <a:p>
+            <a:pPr algn="ctr"/>
+            <a:endParaRPr lang="en-US"/>
+          </a:p>
+        </p:txBody>
+      </p:sp>
+      <p:sp>
+        <p:nvSpPr>
+          <p:cNvPr id="7" name="TextBox 6">
+            <a:extLst>
+              <a:ext uri="{FF2B5EF4-FFF2-40B4-BE49-F238E27FC236}">
+                <a16:creationId xmlns:a16="http://schemas.microsoft.com/office/drawing/2014/main" id="{74F6A971-5342-DD4E-B56A-943CA47A2647}"/>
+              </a:ext>
+            </a:extLst>
+          </p:cNvPr>
+          <p:cNvSpPr txBox="1"/>
+          <p:nvPr/>
+        </p:nvSpPr>
+        <p:spPr>
+          <a:xfrm>
+            <a:off x="3373820" y="2912100"/>
+            <a:ext cx="5044966" cy="369332"/>
+          </a:xfrm>
+          <a:prstGeom prst="rect">
+            <a:avLst/>
+          </a:prstGeom>
+          <a:noFill/>
+          <a:ln>
+            <a:solidFill>
+              <a:schemeClr val="bg2">
+                <a:lumMod val="75000"/>
+              </a:schemeClr>
+            </a:solidFill>
+          </a:ln>
+        </p:spPr>
+        <p:txBody>
+          <a:bodyPr wrap="square" rtlCol="0">
+            <a:spAutoFit/>
+          </a:bodyPr>
+          <a:lstStyle/>
+          <a:p>
+            <a:r>
+              <a:rPr lang="en-US" dirty="0">
+                <a:solidFill>
+                  <a:schemeClr val="bg2">
+                    <a:lumMod val="50000"/>
+                  </a:schemeClr>
+                </a:solidFill>
+                <a:latin typeface="Helvetica" pitchFamily="2" charset="0"/>
+              </a:rPr>
+              <a:t>Search the Web</a:t>
+            </a:r>
+          </a:p>
+        </p:txBody>
+      </p:sp>
+      <p:sp>
+        <p:nvSpPr>
+          <p:cNvPr id="10" name="Rectangle 9">
+            <a:extLst>
+              <a:ext uri="{FF2B5EF4-FFF2-40B4-BE49-F238E27FC236}">
+                <a16:creationId xmlns:a16="http://schemas.microsoft.com/office/drawing/2014/main" id="{0EF07A67-3849-8344-A416-E28DA2599DC7}"/>
+              </a:ext>
+            </a:extLst>
+          </p:cNvPr>
+          <p:cNvSpPr/>
+          <p:nvPr/>
+        </p:nvSpPr>
+        <p:spPr>
+          <a:xfrm>
+            <a:off x="3373820" y="1749973"/>
+            <a:ext cx="5044966" cy="1024759"/>
+          </a:xfrm>
+          <a:prstGeom prst="rect">
+            <a:avLst/>
+          </a:prstGeom>
+          <a:noFill/>
+          <a:ln>
+            <a:noFill/>
+          </a:ln>
+        </p:spPr>
+        <p:style>
+          <a:lnRef idx="2">
+            <a:schemeClr val="accent1">
+              <a:shade val="50000"/>
+            </a:schemeClr>
+          </a:lnRef>
+          <a:fillRef idx="1">
+            <a:schemeClr val="accent1"/>
+          </a:fillRef>
+          <a:effectRef idx="0">
+            <a:schemeClr val="accent1"/>
+          </a:effectRef>
+          <a:fontRef idx="minor">
+            <a:schemeClr val="lt1"/>
+          </a:fontRef>
+        </p:style>
+        <p:txBody>
+          <a:bodyPr rtlCol="0" anchor="ctr"/>
+          <a:lstStyle/>
+          <a:p>
+            <a:pPr algn="ctr"/>
+            <a:r>
+              <a:rPr lang="en-US" sz="5400" dirty="0">
+                <a:ln w="0"/>
+                <a:solidFill>
+                  <a:schemeClr val="tx1"/>
+                </a:solidFill>
+                <a:effectLst>
+                  <a:outerShdw blurRad="38100" dist="19050" dir="2700000" algn="tl" rotWithShape="0">
+                    <a:schemeClr val="dk1">
+                      <a:alpha val="40000"/>
+                    </a:schemeClr>
+                  </a:outerShdw>
+                </a:effectLst>
+                <a:latin typeface="Arial" panose="020B0604020202020204" pitchFamily="34" charset="0"/>
+                <a:cs typeface="Arial" panose="020B0604020202020204" pitchFamily="34" charset="0"/>
+              </a:rPr>
+              <a:t>A Fast Search</a:t>
+            </a:r>
+          </a:p>
+        </p:txBody>
+      </p:sp>
+      <p:sp>
+        <p:nvSpPr>
+          <p:cNvPr id="12" name="Rectangle 11">
+            <a:extLst>
+              <a:ext uri="{FF2B5EF4-FFF2-40B4-BE49-F238E27FC236}">
+                <a16:creationId xmlns:a16="http://schemas.microsoft.com/office/drawing/2014/main" id="{358978DE-743C-1B45-8A32-B74B7031C3CA}"/>
+              </a:ext>
+            </a:extLst>
+          </p:cNvPr>
+          <p:cNvSpPr/>
+          <p:nvPr/>
+        </p:nvSpPr>
+        <p:spPr>
+          <a:xfrm>
+            <a:off x="179614" y="244929"/>
+            <a:ext cx="1355272" cy="522514"/>
+          </a:xfrm>
+          <a:prstGeom prst="rect">
+            <a:avLst/>
+          </a:prstGeom>
+          <a:ln>
+            <a:noFill/>
+          </a:ln>
+        </p:spPr>
+        <p:style>
+          <a:lnRef idx="2">
+            <a:schemeClr val="accent5">
+              <a:shade val="50000"/>
+            </a:schemeClr>
+          </a:lnRef>
+          <a:fillRef idx="1">
+            <a:schemeClr val="accent5"/>
+          </a:fillRef>
+          <a:effectRef idx="0">
+            <a:schemeClr val="accent5"/>
+          </a:effectRef>
+          <a:fontRef idx="minor">
+            <a:schemeClr val="lt1"/>
+          </a:fontRef>
+        </p:style>
+        <p:txBody>
+          <a:bodyPr rtlCol="0" anchor="ctr"/>
+          <a:lstStyle/>
+          <a:p>
+            <a:pPr algn="ctr"/>
+            <a:r>
+              <a:rPr lang="en-US" dirty="0"/>
+              <a:t>Logout</a:t>
+            </a:r>
+          </a:p>
+        </p:txBody>
+      </p:sp>
+      <p:sp>
+        <p:nvSpPr>
+          <p:cNvPr id="13" name="Rectangle 12">
+            <a:extLst>
+              <a:ext uri="{FF2B5EF4-FFF2-40B4-BE49-F238E27FC236}">
+                <a16:creationId xmlns:a16="http://schemas.microsoft.com/office/drawing/2014/main" id="{E69ADF99-7BF4-1542-83D9-860CC1D8A9AF}"/>
+              </a:ext>
+            </a:extLst>
+          </p:cNvPr>
+          <p:cNvSpPr/>
+          <p:nvPr/>
+        </p:nvSpPr>
+        <p:spPr>
+          <a:xfrm>
+            <a:off x="1714500" y="244929"/>
+            <a:ext cx="1355272" cy="522514"/>
+          </a:xfrm>
+          <a:prstGeom prst="rect">
+            <a:avLst/>
+          </a:prstGeom>
+          <a:ln>
+            <a:noFill/>
+          </a:ln>
+        </p:spPr>
+        <p:style>
+          <a:lnRef idx="2">
+            <a:schemeClr val="accent5">
+              <a:shade val="50000"/>
+            </a:schemeClr>
+          </a:lnRef>
+          <a:fillRef idx="1">
+            <a:schemeClr val="accent5"/>
+          </a:fillRef>
+          <a:effectRef idx="0">
+            <a:schemeClr val="accent5"/>
+          </a:effectRef>
+          <a:fontRef idx="minor">
+            <a:schemeClr val="lt1"/>
+          </a:fontRef>
+        </p:style>
+        <p:txBody>
+          <a:bodyPr rtlCol="0" anchor="ctr"/>
+          <a:lstStyle/>
+          <a:p>
+            <a:pPr algn="ctr"/>
+            <a:r>
+              <a:rPr lang="en-US" dirty="0"/>
+              <a:t>About</a:t>
+            </a:r>
+          </a:p>
+        </p:txBody>
+      </p:sp>
+    </p:spTree>
+    <p:extLst>
+      <p:ext uri="{BB962C8B-B14F-4D97-AF65-F5344CB8AC3E}">
+        <p14:creationId xmlns:p14="http://schemas.microsoft.com/office/powerpoint/2010/main" val="719611744"/>
       </p:ext>
     </p:extLst>
   </p:cSld>

</xml_diff>

<commit_message>
added text rendering and alignment
</commit_message>
<xml_diff>
--- a/TeluguApp.pptx
+++ b/TeluguApp.pptx
@@ -4039,8 +4039,71 @@
         </p:nvSpPr>
         <p:spPr>
           <a:xfrm>
-            <a:off x="3494761" y="1302707"/>
-            <a:ext cx="5593629" cy="3444658"/>
+            <a:off x="1252604" y="-449546"/>
+            <a:ext cx="9469676" cy="6159159"/>
+          </a:xfrm>
+          <a:prstGeom prst="rect">
+            <a:avLst/>
+          </a:prstGeom>
+          <a:noFill/>
+          <a:ln>
+            <a:noFill/>
+          </a:ln>
+        </p:spPr>
+        <p:style>
+          <a:lnRef idx="2">
+            <a:schemeClr val="accent1">
+              <a:shade val="50000"/>
+            </a:schemeClr>
+          </a:lnRef>
+          <a:fillRef idx="1">
+            <a:schemeClr val="accent1"/>
+          </a:fillRef>
+          <a:effectRef idx="0">
+            <a:schemeClr val="accent1"/>
+          </a:effectRef>
+          <a:fontRef idx="minor">
+            <a:schemeClr val="lt1"/>
+          </a:fontRef>
+        </p:style>
+        <p:txBody>
+          <a:bodyPr rtlCol="0" anchor="ctr"/>
+          <a:lstStyle/>
+          <a:p>
+            <a:pPr lvl="0" algn="ctr"/>
+            <a:r>
+              <a:rPr lang="en-US" sz="41300" dirty="0">
+                <a:solidFill>
+                  <a:srgbClr val="222222"/>
+                </a:solidFill>
+                <a:latin typeface="lucida grande" panose="020B0600040502020204" pitchFamily="34" charset="0"/>
+              </a:rPr>
+              <a:t>a</a:t>
+            </a:r>
+            <a:endParaRPr lang="en-US" sz="41300" dirty="0">
+              <a:solidFill>
+                <a:prstClr val="black"/>
+              </a:solidFill>
+            </a:endParaRPr>
+          </a:p>
+        </p:txBody>
+      </p:sp>
+      <p:sp>
+        <p:nvSpPr>
+          <p:cNvPr id="3" name="Rectangle 2">
+            <a:extLst>
+              <a:ext uri="{FF2B5EF4-FFF2-40B4-BE49-F238E27FC236}">
+                <a16:creationId xmlns:a16="http://schemas.microsoft.com/office/drawing/2014/main" id="{9ED24AE5-E5FE-4C46-B1E3-B08DA2CB972C}"/>
+              </a:ext>
+            </a:extLst>
+          </p:cNvPr>
+          <p:cNvSpPr/>
+          <p:nvPr/>
+        </p:nvSpPr>
+        <p:spPr>
+          <a:xfrm>
+            <a:off x="2655518" y="538619"/>
+            <a:ext cx="6551112" cy="4910203"/>
           </a:xfrm>
           <a:prstGeom prst="rect">
             <a:avLst/>
@@ -4048,7 +4111,7 @@
           <a:noFill/>
           <a:ln>
             <a:solidFill>
-              <a:schemeClr val="bg2"/>
+              <a:schemeClr val="tx1"/>
             </a:solidFill>
           </a:ln>
         </p:spPr>
@@ -4072,21 +4135,8 @@
           <a:bodyPr rtlCol="0" anchor="ctr"/>
           <a:lstStyle/>
           <a:p>
-            <a:pPr lvl="0" algn="ctr"/>
-            <a:r>
-              <a:rPr lang="te-IN" sz="41300" dirty="0">
-                <a:solidFill>
-                  <a:srgbClr val="222222"/>
-                </a:solidFill>
-                <a:latin typeface="lucida grande" panose="020B0600040502020204" pitchFamily="34" charset="0"/>
-              </a:rPr>
-              <a:t>అ</a:t>
-            </a:r>
-            <a:endParaRPr lang="en-US" sz="41300" dirty="0">
-              <a:solidFill>
-                <a:prstClr val="black"/>
-              </a:solidFill>
-            </a:endParaRPr>
+            <a:pPr algn="ctr"/>
+            <a:endParaRPr lang="en-US"/>
           </a:p>
         </p:txBody>
       </p:sp>

</xml_diff>

<commit_message>
moed to seperate parsers and added border elements
</commit_message>
<xml_diff>
--- a/TeluguApp.pptx
+++ b/TeluguApp.pptx
@@ -4039,71 +4039,8 @@
         </p:nvSpPr>
         <p:spPr>
           <a:xfrm>
-            <a:off x="1252604" y="-449546"/>
-            <a:ext cx="9469676" cy="6159159"/>
-          </a:xfrm>
-          <a:prstGeom prst="rect">
-            <a:avLst/>
-          </a:prstGeom>
-          <a:noFill/>
-          <a:ln>
-            <a:noFill/>
-          </a:ln>
-        </p:spPr>
-        <p:style>
-          <a:lnRef idx="2">
-            <a:schemeClr val="accent1">
-              <a:shade val="50000"/>
-            </a:schemeClr>
-          </a:lnRef>
-          <a:fillRef idx="1">
-            <a:schemeClr val="accent1"/>
-          </a:fillRef>
-          <a:effectRef idx="0">
-            <a:schemeClr val="accent1"/>
-          </a:effectRef>
-          <a:fontRef idx="minor">
-            <a:schemeClr val="lt1"/>
-          </a:fontRef>
-        </p:style>
-        <p:txBody>
-          <a:bodyPr rtlCol="0" anchor="ctr"/>
-          <a:lstStyle/>
-          <a:p>
-            <a:pPr lvl="0" algn="ctr"/>
-            <a:r>
-              <a:rPr lang="en-US" sz="41300" dirty="0">
-                <a:solidFill>
-                  <a:srgbClr val="222222"/>
-                </a:solidFill>
-                <a:latin typeface="lucida grande" panose="020B0600040502020204" pitchFamily="34" charset="0"/>
-              </a:rPr>
-              <a:t>a</a:t>
-            </a:r>
-            <a:endParaRPr lang="en-US" sz="41300" dirty="0">
-              <a:solidFill>
-                <a:prstClr val="black"/>
-              </a:solidFill>
-            </a:endParaRPr>
-          </a:p>
-        </p:txBody>
-      </p:sp>
-      <p:sp>
-        <p:nvSpPr>
-          <p:cNvPr id="3" name="Rectangle 2">
-            <a:extLst>
-              <a:ext uri="{FF2B5EF4-FFF2-40B4-BE49-F238E27FC236}">
-                <a16:creationId xmlns:a16="http://schemas.microsoft.com/office/drawing/2014/main" id="{9ED24AE5-E5FE-4C46-B1E3-B08DA2CB972C}"/>
-              </a:ext>
-            </a:extLst>
-          </p:cNvPr>
-          <p:cNvSpPr/>
-          <p:nvPr/>
-        </p:nvSpPr>
-        <p:spPr>
-          <a:xfrm>
-            <a:off x="2655518" y="538619"/>
-            <a:ext cx="6551112" cy="4910203"/>
+            <a:off x="2126774" y="567559"/>
+            <a:ext cx="8120970" cy="4921337"/>
           </a:xfrm>
           <a:prstGeom prst="rect">
             <a:avLst/>
@@ -4135,8 +4072,21 @@
           <a:bodyPr rtlCol="0" anchor="ctr"/>
           <a:lstStyle/>
           <a:p>
-            <a:pPr algn="ctr"/>
-            <a:endParaRPr lang="en-US"/>
+            <a:pPr lvl="0" algn="ctr"/>
+            <a:r>
+              <a:rPr lang="en-US" sz="41300" dirty="0">
+                <a:solidFill>
+                  <a:srgbClr val="222222"/>
+                </a:solidFill>
+                <a:latin typeface="lucida grande" panose="020B0600040502020204" pitchFamily="34" charset="0"/>
+              </a:rPr>
+              <a:t>a</a:t>
+            </a:r>
+            <a:endParaRPr lang="en-US" sz="41300" dirty="0">
+              <a:solidFill>
+                <a:prstClr val="black"/>
+              </a:solidFill>
+            </a:endParaRPr>
           </a:p>
         </p:txBody>
       </p:sp>

</xml_diff>

<commit_message>
added support for ellipses
</commit_message>
<xml_diff>
--- a/TeluguApp.pptx
+++ b/TeluguApp.pptx
@@ -3753,7 +3753,7 @@
       </p:sp>
       <p:sp>
         <p:nvSpPr>
-          <p:cNvPr id="15" name="Oval 14" title="CircleShape">
+          <p:cNvPr id="15" name="Oval 14" title="CircleOutlineShape">
             <a:extLst>
               <a:ext uri="{FF2B5EF4-FFF2-40B4-BE49-F238E27FC236}">
                 <a16:creationId xmlns:a16="http://schemas.microsoft.com/office/drawing/2014/main" id="{0B00EFF6-4AAC-8A40-900C-E9C6E26F8072}"/>
@@ -3804,7 +3804,7 @@
       </p:sp>
       <p:sp>
         <p:nvSpPr>
-          <p:cNvPr id="16" name="Rounded Rectangle 15" title="RoundedRectangle">
+          <p:cNvPr id="16" name="Rounded Rectangle 15" title="RoundedTransparentRectangle">
             <a:extLst>
               <a:ext uri="{FF2B5EF4-FFF2-40B4-BE49-F238E27FC236}">
                 <a16:creationId xmlns:a16="http://schemas.microsoft.com/office/drawing/2014/main" id="{2C2FA61B-3B18-4B45-88B6-F0DA6F135B13}"/>
@@ -3865,6 +3865,38 @@
               </a:rPr>
               <a:t>Transparent</a:t>
             </a:r>
+          </a:p>
+        </p:txBody>
+      </p:sp>
+      <p:sp>
+        <p:nvSpPr>
+          <p:cNvPr id="17" name="TextBox 16">
+            <a:extLst>
+              <a:ext uri="{FF2B5EF4-FFF2-40B4-BE49-F238E27FC236}">
+                <a16:creationId xmlns:a16="http://schemas.microsoft.com/office/drawing/2014/main" id="{4CFFB7B4-0DEE-ED44-85EC-66327F58C081}"/>
+              </a:ext>
+            </a:extLst>
+          </p:cNvPr>
+          <p:cNvSpPr txBox="1"/>
+          <p:nvPr/>
+        </p:nvSpPr>
+        <p:spPr>
+          <a:xfrm>
+            <a:off x="-961697" y="567559"/>
+            <a:ext cx="184731" cy="369332"/>
+          </a:xfrm>
+          <a:prstGeom prst="rect">
+            <a:avLst/>
+          </a:prstGeom>
+          <a:noFill/>
+        </p:spPr>
+        <p:txBody>
+          <a:bodyPr wrap="none" rtlCol="0">
+            <a:spAutoFit/>
+          </a:bodyPr>
+          <a:lstStyle/>
+          <a:p>
+            <a:endParaRPr lang="en-US" dirty="0"/>
           </a:p>
         </p:txBody>
       </p:sp>
@@ -4039,17 +4071,15 @@
         </p:nvSpPr>
         <p:spPr>
           <a:xfrm>
-            <a:off x="2126774" y="567559"/>
-            <a:ext cx="8120970" cy="4921337"/>
+            <a:off x="1252604" y="-449546"/>
+            <a:ext cx="9469676" cy="6159159"/>
           </a:xfrm>
           <a:prstGeom prst="rect">
             <a:avLst/>
           </a:prstGeom>
           <a:noFill/>
           <a:ln>
-            <a:solidFill>
-              <a:schemeClr val="tx1"/>
-            </a:solidFill>
+            <a:noFill/>
           </a:ln>
         </p:spPr>
         <p:style>
@@ -4087,6 +4117,60 @@
                 <a:prstClr val="black"/>
               </a:solidFill>
             </a:endParaRPr>
+          </a:p>
+        </p:txBody>
+      </p:sp>
+      <p:sp>
+        <p:nvSpPr>
+          <p:cNvPr id="3" name="Rectangle 2">
+            <a:hlinkClick r:id="rId2"/>
+            <a:extLst>
+              <a:ext uri="{FF2B5EF4-FFF2-40B4-BE49-F238E27FC236}">
+                <a16:creationId xmlns:a16="http://schemas.microsoft.com/office/drawing/2014/main" id="{9ED24AE5-E5FE-4C46-B1E3-B08DA2CB972C}"/>
+              </a:ext>
+            </a:extLst>
+          </p:cNvPr>
+          <p:cNvSpPr/>
+          <p:nvPr/>
+        </p:nvSpPr>
+        <p:spPr>
+          <a:xfrm>
+            <a:off x="2655518" y="538619"/>
+            <a:ext cx="6551112" cy="4910203"/>
+          </a:xfrm>
+          <a:prstGeom prst="rect">
+            <a:avLst/>
+          </a:prstGeom>
+          <a:noFill/>
+          <a:ln w="57150">
+            <a:solidFill>
+              <a:schemeClr val="tx1"/>
+            </a:solidFill>
+            <a:prstDash val="solid"/>
+          </a:ln>
+        </p:spPr>
+        <p:style>
+          <a:lnRef idx="2">
+            <a:schemeClr val="accent1">
+              <a:shade val="50000"/>
+            </a:schemeClr>
+          </a:lnRef>
+          <a:fillRef idx="1">
+            <a:schemeClr val="accent1"/>
+          </a:fillRef>
+          <a:effectRef idx="0">
+            <a:schemeClr val="accent1"/>
+          </a:effectRef>
+          <a:fontRef idx="minor">
+            <a:schemeClr val="lt1"/>
+          </a:fontRef>
+        </p:style>
+        <p:txBody>
+          <a:bodyPr rtlCol="0" anchor="ctr"/>
+          <a:lstStyle/>
+          <a:p>
+            <a:pPr algn="ctr"/>
+            <a:endParaRPr lang="en-US"/>
           </a:p>
         </p:txBody>
       </p:sp>

</xml_diff>

<commit_message>
added hyperlink parser for rectangles
</commit_message>
<xml_diff>
--- a/TeluguApp.pptx
+++ b/TeluguApp.pptx
@@ -3868,38 +3868,6 @@
           </a:p>
         </p:txBody>
       </p:sp>
-      <p:sp>
-        <p:nvSpPr>
-          <p:cNvPr id="17" name="TextBox 16">
-            <a:extLst>
-              <a:ext uri="{FF2B5EF4-FFF2-40B4-BE49-F238E27FC236}">
-                <a16:creationId xmlns:a16="http://schemas.microsoft.com/office/drawing/2014/main" id="{4CFFB7B4-0DEE-ED44-85EC-66327F58C081}"/>
-              </a:ext>
-            </a:extLst>
-          </p:cNvPr>
-          <p:cNvSpPr txBox="1"/>
-          <p:nvPr/>
-        </p:nvSpPr>
-        <p:spPr>
-          <a:xfrm>
-            <a:off x="-961697" y="567559"/>
-            <a:ext cx="184731" cy="369332"/>
-          </a:xfrm>
-          <a:prstGeom prst="rect">
-            <a:avLst/>
-          </a:prstGeom>
-          <a:noFill/>
-        </p:spPr>
-        <p:txBody>
-          <a:bodyPr wrap="none" rtlCol="0">
-            <a:spAutoFit/>
-          </a:bodyPr>
-          <a:lstStyle/>
-          <a:p>
-            <a:endParaRPr lang="en-US" dirty="0"/>
-          </a:p>
-        </p:txBody>
-      </p:sp>
     </p:spTree>
     <p:extLst>
       <p:ext uri="{BB962C8B-B14F-4D97-AF65-F5344CB8AC3E}">

</xml_diff>